<commit_message>
Actualización tabla de cursos en Alumnos
</commit_message>
<xml_diff>
--- a/INSTITUTO POLITÉCNICO NACIONAL.pptx
+++ b/INSTITUTO POLITÉCNICO NACIONAL.pptx
@@ -18,7 +18,9 @@
     <p:sldId id="266" r:id="rId12"/>
     <p:sldId id="267" r:id="rId13"/>
     <p:sldId id="268" r:id="rId14"/>
-    <p:sldId id="269" r:id="rId15"/>
+    <p:sldId id="270" r:id="rId15"/>
+    <p:sldId id="271" r:id="rId16"/>
+    <p:sldId id="269" r:id="rId17"/>
   </p:sldIdLst>
   <p:sldSz cx="12192000" cy="6858000"/>
   <p:notesSz cx="6858000" cy="9144000"/>
@@ -274,7 +276,7 @@
           <a:p>
             <a:fld id="{3A02FAB3-715B-4700-96CD-5E0B1F22FD83}" type="datetimeFigureOut">
               <a:rPr lang="es-MX" smtClean="0"/>
-              <a:t>18/12/2020</a:t>
+              <a:t>19/12/2020</a:t>
             </a:fld>
             <a:endParaRPr lang="es-MX"/>
           </a:p>
@@ -474,7 +476,7 @@
           <a:p>
             <a:fld id="{3A02FAB3-715B-4700-96CD-5E0B1F22FD83}" type="datetimeFigureOut">
               <a:rPr lang="es-MX" smtClean="0"/>
-              <a:t>18/12/2020</a:t>
+              <a:t>19/12/2020</a:t>
             </a:fld>
             <a:endParaRPr lang="es-MX"/>
           </a:p>
@@ -684,7 +686,7 @@
           <a:p>
             <a:fld id="{3A02FAB3-715B-4700-96CD-5E0B1F22FD83}" type="datetimeFigureOut">
               <a:rPr lang="es-MX" smtClean="0"/>
-              <a:t>18/12/2020</a:t>
+              <a:t>19/12/2020</a:t>
             </a:fld>
             <a:endParaRPr lang="es-MX"/>
           </a:p>
@@ -884,7 +886,7 @@
           <a:p>
             <a:fld id="{3A02FAB3-715B-4700-96CD-5E0B1F22FD83}" type="datetimeFigureOut">
               <a:rPr lang="es-MX" smtClean="0"/>
-              <a:t>18/12/2020</a:t>
+              <a:t>19/12/2020</a:t>
             </a:fld>
             <a:endParaRPr lang="es-MX"/>
           </a:p>
@@ -1160,7 +1162,7 @@
           <a:p>
             <a:fld id="{3A02FAB3-715B-4700-96CD-5E0B1F22FD83}" type="datetimeFigureOut">
               <a:rPr lang="es-MX" smtClean="0"/>
-              <a:t>18/12/2020</a:t>
+              <a:t>19/12/2020</a:t>
             </a:fld>
             <a:endParaRPr lang="es-MX"/>
           </a:p>
@@ -1428,7 +1430,7 @@
           <a:p>
             <a:fld id="{3A02FAB3-715B-4700-96CD-5E0B1F22FD83}" type="datetimeFigureOut">
               <a:rPr lang="es-MX" smtClean="0"/>
-              <a:t>18/12/2020</a:t>
+              <a:t>19/12/2020</a:t>
             </a:fld>
             <a:endParaRPr lang="es-MX"/>
           </a:p>
@@ -1843,7 +1845,7 @@
           <a:p>
             <a:fld id="{3A02FAB3-715B-4700-96CD-5E0B1F22FD83}" type="datetimeFigureOut">
               <a:rPr lang="es-MX" smtClean="0"/>
-              <a:t>18/12/2020</a:t>
+              <a:t>19/12/2020</a:t>
             </a:fld>
             <a:endParaRPr lang="es-MX"/>
           </a:p>
@@ -1985,7 +1987,7 @@
           <a:p>
             <a:fld id="{3A02FAB3-715B-4700-96CD-5E0B1F22FD83}" type="datetimeFigureOut">
               <a:rPr lang="es-MX" smtClean="0"/>
-              <a:t>18/12/2020</a:t>
+              <a:t>19/12/2020</a:t>
             </a:fld>
             <a:endParaRPr lang="es-MX"/>
           </a:p>
@@ -2098,7 +2100,7 @@
           <a:p>
             <a:fld id="{3A02FAB3-715B-4700-96CD-5E0B1F22FD83}" type="datetimeFigureOut">
               <a:rPr lang="es-MX" smtClean="0"/>
-              <a:t>18/12/2020</a:t>
+              <a:t>19/12/2020</a:t>
             </a:fld>
             <a:endParaRPr lang="es-MX"/>
           </a:p>
@@ -2411,7 +2413,7 @@
           <a:p>
             <a:fld id="{3A02FAB3-715B-4700-96CD-5E0B1F22FD83}" type="datetimeFigureOut">
               <a:rPr lang="es-MX" smtClean="0"/>
-              <a:t>18/12/2020</a:t>
+              <a:t>19/12/2020</a:t>
             </a:fld>
             <a:endParaRPr lang="es-MX"/>
           </a:p>
@@ -2700,7 +2702,7 @@
           <a:p>
             <a:fld id="{3A02FAB3-715B-4700-96CD-5E0B1F22FD83}" type="datetimeFigureOut">
               <a:rPr lang="es-MX" smtClean="0"/>
-              <a:t>18/12/2020</a:t>
+              <a:t>19/12/2020</a:t>
             </a:fld>
             <a:endParaRPr lang="es-MX"/>
           </a:p>
@@ -2949,7 +2951,7 @@
           <a:p>
             <a:fld id="{3A02FAB3-715B-4700-96CD-5E0B1F22FD83}" type="datetimeFigureOut">
               <a:rPr lang="es-MX" smtClean="0"/>
-              <a:t>18/12/2020</a:t>
+              <a:t>19/12/2020</a:t>
             </a:fld>
             <a:endParaRPr lang="es-MX"/>
           </a:p>
@@ -3426,7 +3428,7 @@
         </p:nvSpPr>
         <p:spPr>
           <a:xfrm>
-            <a:off x="1524000" y="2534864"/>
+            <a:off x="1524000" y="3010394"/>
             <a:ext cx="9144000" cy="1655762"/>
           </a:xfrm>
         </p:spPr>
@@ -3442,7 +3444,7 @@
                 <a:latin typeface="Arial" panose="020B0604020202020204" pitchFamily="34" charset="0"/>
                 <a:ea typeface="Calibri" panose="020F0502020204030204" pitchFamily="34" charset="0"/>
               </a:rPr>
-              <a:t>SISTEMA DE GESTIÓN ESCOLAR QUE PERMITA LA ADMINISTRACIÓN DE PERSONAL DOCENTE Y ESTUDIANTIL DENTRO DE UNA INSTITUCIÓN ACADÉMICA DE MANERA REMOTA</a:t>
+              <a:t>SISTEMA DE GESTIÓN ESCOLAR QUE PERMITA LA ADMINISTRACIÓN DE PERSONAL DOCENTE Y ESTUDIANTIL PERSONAL ADMINISTRATIVO DENTRO DE UNA INSTITUCIÓN ACADÉMICA DE MANERA REMOTA</a:t>
             </a:r>
             <a:endParaRPr lang="es-MX" sz="3200" i="1" dirty="0"/>
           </a:p>
@@ -3644,7 +3646,7 @@
         </p:nvSpPr>
         <p:spPr>
           <a:xfrm>
-            <a:off x="3484484" y="4548658"/>
+            <a:off x="3484484" y="5160799"/>
             <a:ext cx="5734975" cy="1754326"/>
           </a:xfrm>
           <a:prstGeom prst="rect">
@@ -3659,33 +3661,26 @@
           <a:lstStyle/>
           <a:p>
             <a:r>
-              <a:rPr lang="es-MX"/>
-              <a:t>C. César Rodríguez Calderón</a:t>
-            </a:r>
-          </a:p>
-          <a:p>
-            <a:endParaRPr lang="es-MX"/>
-          </a:p>
-          <a:p>
-            <a:endParaRPr lang="es-MX"/>
-          </a:p>
-          <a:p>
-            <a:r>
-              <a:rPr lang="es-MX"/>
-              <a:t>Asesores:</a:t>
-            </a:r>
-          </a:p>
-          <a:p>
-            <a:r>
-              <a:rPr lang="es-MX"/>
-              <a:t>Ing. Arturo Alonso Hit Espinosa</a:t>
-            </a:r>
-          </a:p>
-          <a:p>
-            <a:r>
-              <a:rPr lang="es-MX"/>
-              <a:t>Ing. Guillermo Manuel Escárcega Carrera</a:t>
-            </a:r>
+              <a:rPr lang="es-MX" dirty="0"/>
+              <a:t>Integrante</a:t>
+            </a:r>
+          </a:p>
+          <a:p>
+            <a:endParaRPr lang="es-MX" dirty="0"/>
+          </a:p>
+          <a:p>
+            <a:r>
+              <a:rPr lang="es-MX" dirty="0"/>
+              <a:t>César Rodríguez Calderón</a:t>
+            </a:r>
+          </a:p>
+          <a:p>
+            <a:endParaRPr lang="es-MX" dirty="0"/>
+          </a:p>
+          <a:p>
+            <a:endParaRPr lang="es-MX" dirty="0"/>
+          </a:p>
+          <a:p>
             <a:endParaRPr lang="es-MX" dirty="0"/>
           </a:p>
         </p:txBody>
@@ -4636,7 +4631,7 @@
         </p:spPr>
         <p:txBody>
           <a:bodyPr>
-            <a:normAutofit/>
+            <a:normAutofit fontScale="90000"/>
           </a:bodyPr>
           <a:lstStyle/>
           <a:p>
@@ -4645,7 +4640,7 @@
                 <a:latin typeface="Arial" panose="020B0604020202020204" pitchFamily="34" charset="0"/>
                 <a:cs typeface="Arial" panose="020B0604020202020204" pitchFamily="34" charset="0"/>
               </a:rPr>
-              <a:t>ETRUCTURAS DE DATOS</a:t>
+              <a:t>ESTRUCTURAS DE DATOS</a:t>
             </a:r>
             <a:br>
               <a:rPr lang="es-MX" sz="4100" dirty="0">
@@ -4822,41 +4817,32 @@
       </p:sp>
       <p:pic>
         <p:nvPicPr>
-          <p:cNvPr id="7" name="Imagen 6">
-            <a:extLst>
-              <a:ext uri="{FF2B5EF4-FFF2-40B4-BE49-F238E27FC236}">
-                <a16:creationId xmlns:a16="http://schemas.microsoft.com/office/drawing/2014/main" id="{51485E4D-F59C-4D55-B64C-8FA34AC7BE25}"/>
-              </a:ext>
-            </a:extLst>
-          </p:cNvPr>
-          <p:cNvPicPr/>
+          <p:cNvPr id="5" name="Imagen 4">
+            <a:extLst>
+              <a:ext uri="{FF2B5EF4-FFF2-40B4-BE49-F238E27FC236}">
+                <a16:creationId xmlns:a16="http://schemas.microsoft.com/office/drawing/2014/main" id="{7479DF1D-4E6B-413F-A085-0F7696475802}"/>
+              </a:ext>
+            </a:extLst>
+          </p:cNvPr>
+          <p:cNvPicPr>
+            <a:picLocks noChangeAspect="1"/>
+          </p:cNvPicPr>
           <p:nvPr/>
         </p:nvPicPr>
         <p:blipFill>
-          <a:blip r:embed="rId2" cstate="print">
-            <a:extLst>
-              <a:ext uri="{28A0092B-C50C-407E-A947-70E740481C1C}">
-                <a14:useLocalDpi xmlns:a14="http://schemas.microsoft.com/office/drawing/2010/main" val="0"/>
-              </a:ext>
-            </a:extLst>
-          </a:blip>
-          <a:srcRect/>
+          <a:blip r:embed="rId2"/>
           <a:stretch>
             <a:fillRect/>
           </a:stretch>
         </p:blipFill>
-        <p:spPr bwMode="auto">
+        <p:spPr>
           <a:xfrm>
-            <a:off x="221193" y="2455526"/>
-            <a:ext cx="7335782" cy="3735724"/>
+            <a:off x="173275" y="2671040"/>
+            <a:ext cx="7296150" cy="3695700"/>
           </a:xfrm>
           <a:prstGeom prst="rect">
             <a:avLst/>
           </a:prstGeom>
-          <a:noFill/>
-          <a:ln>
-            <a:noFill/>
-          </a:ln>
         </p:spPr>
       </p:pic>
     </p:spTree>
@@ -6261,41 +6247,32 @@
       </p:sp>
       <p:pic>
         <p:nvPicPr>
-          <p:cNvPr id="5" name="Imagen 4">
-            <a:extLst>
-              <a:ext uri="{FF2B5EF4-FFF2-40B4-BE49-F238E27FC236}">
-                <a16:creationId xmlns:a16="http://schemas.microsoft.com/office/drawing/2014/main" id="{B5E15C96-EDE9-4144-B088-96F336BD5FB6}"/>
-              </a:ext>
-            </a:extLst>
-          </p:cNvPr>
-          <p:cNvPicPr/>
+          <p:cNvPr id="6" name="Imagen 5">
+            <a:extLst>
+              <a:ext uri="{FF2B5EF4-FFF2-40B4-BE49-F238E27FC236}">
+                <a16:creationId xmlns:a16="http://schemas.microsoft.com/office/drawing/2014/main" id="{401FD21C-B1C3-43A7-8186-BFB4E1D8EEA8}"/>
+              </a:ext>
+            </a:extLst>
+          </p:cNvPr>
+          <p:cNvPicPr>
+            <a:picLocks noChangeAspect="1"/>
+          </p:cNvPicPr>
           <p:nvPr/>
         </p:nvPicPr>
         <p:blipFill>
-          <a:blip r:embed="rId2">
-            <a:extLst>
-              <a:ext uri="{28A0092B-C50C-407E-A947-70E740481C1C}">
-                <a14:useLocalDpi xmlns:a14="http://schemas.microsoft.com/office/drawing/2010/main" val="0"/>
-              </a:ext>
-            </a:extLst>
-          </a:blip>
-          <a:srcRect/>
+          <a:blip r:embed="rId2"/>
           <a:stretch>
             <a:fillRect/>
           </a:stretch>
         </p:blipFill>
-        <p:spPr bwMode="auto">
+        <p:spPr>
           <a:xfrm>
-            <a:off x="3617558" y="1265947"/>
-            <a:ext cx="8628172" cy="5087228"/>
+            <a:off x="3590925" y="1193076"/>
+            <a:ext cx="8601075" cy="5057775"/>
           </a:xfrm>
           <a:prstGeom prst="rect">
             <a:avLst/>
           </a:prstGeom>
-          <a:noFill/>
-          <a:ln>
-            <a:noFill/>
-          </a:ln>
         </p:spPr>
       </p:pic>
     </p:spTree>
@@ -6312,6 +6289,572 @@
 </file>
 
 <file path=ppt/slides/slide14.xml><?xml version="1.0" encoding="utf-8"?>
+<p:sld xmlns:a="http://schemas.openxmlformats.org/drawingml/2006/main" xmlns:r="http://schemas.openxmlformats.org/officeDocument/2006/relationships" xmlns:p="http://schemas.openxmlformats.org/presentationml/2006/main">
+  <p:cSld>
+    <p:spTree>
+      <p:nvGrpSpPr>
+        <p:cNvPr id="1" name=""/>
+        <p:cNvGrpSpPr/>
+        <p:nvPr/>
+      </p:nvGrpSpPr>
+      <p:grpSpPr>
+        <a:xfrm>
+          <a:off x="0" y="0"/>
+          <a:ext cx="0" cy="0"/>
+          <a:chOff x="0" y="0"/>
+          <a:chExt cx="0" cy="0"/>
+        </a:xfrm>
+      </p:grpSpPr>
+      <p:sp>
+        <p:nvSpPr>
+          <p:cNvPr id="2" name="Título 1">
+            <a:extLst>
+              <a:ext uri="{FF2B5EF4-FFF2-40B4-BE49-F238E27FC236}">
+                <a16:creationId xmlns:a16="http://schemas.microsoft.com/office/drawing/2014/main" id="{419CBEB2-36C5-444D-A099-DCC724632745}"/>
+              </a:ext>
+            </a:extLst>
+          </p:cNvPr>
+          <p:cNvSpPr>
+            <a:spLocks noGrp="1"/>
+          </p:cNvSpPr>
+          <p:nvPr>
+            <p:ph type="title"/>
+          </p:nvPr>
+        </p:nvSpPr>
+        <p:spPr/>
+        <p:txBody>
+          <a:bodyPr>
+            <a:normAutofit/>
+          </a:bodyPr>
+          <a:lstStyle/>
+          <a:p>
+            <a:r>
+              <a:rPr lang="es-MX" sz="3600" b="1" dirty="0">
+                <a:latin typeface="Arial" panose="020B0604020202020204" pitchFamily="34" charset="0"/>
+                <a:cs typeface="Arial" panose="020B0604020202020204" pitchFamily="34" charset="0"/>
+              </a:rPr>
+              <a:t>Análisis Económico</a:t>
+            </a:r>
+          </a:p>
+        </p:txBody>
+      </p:sp>
+      <p:graphicFrame>
+        <p:nvGraphicFramePr>
+          <p:cNvPr id="4" name="Tabla 4">
+            <a:extLst>
+              <a:ext uri="{FF2B5EF4-FFF2-40B4-BE49-F238E27FC236}">
+                <a16:creationId xmlns:a16="http://schemas.microsoft.com/office/drawing/2014/main" id="{339D5A08-1FA7-4D2A-8673-5E04BCAA6CDE}"/>
+              </a:ext>
+            </a:extLst>
+          </p:cNvPr>
+          <p:cNvGraphicFramePr>
+            <a:graphicFrameLocks noGrp="1"/>
+          </p:cNvGraphicFramePr>
+          <p:nvPr>
+            <p:ph idx="1"/>
+            <p:extLst>
+              <p:ext uri="{D42A27DB-BD31-4B8C-83A1-F6EECF244321}">
+                <p14:modId xmlns:p14="http://schemas.microsoft.com/office/powerpoint/2010/main" val="1915542186"/>
+              </p:ext>
+            </p:extLst>
+          </p:nvPr>
+        </p:nvGraphicFramePr>
+        <p:xfrm>
+          <a:off x="838203" y="1887767"/>
+          <a:ext cx="10515597" cy="2103120"/>
+        </p:xfrm>
+        <a:graphic>
+          <a:graphicData uri="http://schemas.openxmlformats.org/drawingml/2006/table">
+            <a:tbl>
+              <a:tblPr firstRow="1" bandRow="1">
+                <a:tableStyleId>{5C22544A-7EE6-4342-B048-85BDC9FD1C3A}</a:tableStyleId>
+              </a:tblPr>
+              <a:tblGrid>
+                <a:gridCol w="3505199">
+                  <a:extLst>
+                    <a:ext uri="{9D8B030D-6E8A-4147-A177-3AD203B41FA5}">
+                      <a16:colId xmlns:a16="http://schemas.microsoft.com/office/drawing/2014/main" val="1210047309"/>
+                    </a:ext>
+                  </a:extLst>
+                </a:gridCol>
+                <a:gridCol w="3505199">
+                  <a:extLst>
+                    <a:ext uri="{9D8B030D-6E8A-4147-A177-3AD203B41FA5}">
+                      <a16:colId xmlns:a16="http://schemas.microsoft.com/office/drawing/2014/main" val="909873749"/>
+                    </a:ext>
+                  </a:extLst>
+                </a:gridCol>
+                <a:gridCol w="3505199">
+                  <a:extLst>
+                    <a:ext uri="{9D8B030D-6E8A-4147-A177-3AD203B41FA5}">
+                      <a16:colId xmlns:a16="http://schemas.microsoft.com/office/drawing/2014/main" val="688017912"/>
+                    </a:ext>
+                  </a:extLst>
+                </a:gridCol>
+              </a:tblGrid>
+              <a:tr h="267967">
+                <a:tc>
+                  <a:txBody>
+                    <a:bodyPr/>
+                    <a:lstStyle/>
+                    <a:p>
+                      <a:r>
+                        <a:rPr lang="es-MX" dirty="0">
+                          <a:solidFill>
+                            <a:srgbClr val="FFFF00"/>
+                          </a:solidFill>
+                        </a:rPr>
+                        <a:t>Perfil</a:t>
+                      </a:r>
+                    </a:p>
+                  </a:txBody>
+                  <a:tcPr/>
+                </a:tc>
+                <a:tc>
+                  <a:txBody>
+                    <a:bodyPr/>
+                    <a:lstStyle/>
+                    <a:p>
+                      <a:r>
+                        <a:rPr lang="es-MX" dirty="0">
+                          <a:solidFill>
+                            <a:srgbClr val="FFFF00"/>
+                          </a:solidFill>
+                        </a:rPr>
+                        <a:t>Tiempo</a:t>
+                      </a:r>
+                    </a:p>
+                  </a:txBody>
+                  <a:tcPr/>
+                </a:tc>
+                <a:tc>
+                  <a:txBody>
+                    <a:bodyPr/>
+                    <a:lstStyle/>
+                    <a:p>
+                      <a:r>
+                        <a:rPr lang="es-MX" dirty="0">
+                          <a:solidFill>
+                            <a:srgbClr val="FFFF00"/>
+                          </a:solidFill>
+                        </a:rPr>
+                        <a:t>Costo</a:t>
+                      </a:r>
+                    </a:p>
+                  </a:txBody>
+                  <a:tcPr/>
+                </a:tc>
+                <a:extLst>
+                  <a:ext uri="{0D108BD9-81ED-4DB2-BD59-A6C34878D82A}">
+                    <a16:rowId xmlns:a16="http://schemas.microsoft.com/office/drawing/2014/main" val="3432406206"/>
+                  </a:ext>
+                </a:extLst>
+              </a:tr>
+              <a:tr h="267967">
+                <a:tc>
+                  <a:txBody>
+                    <a:bodyPr/>
+                    <a:lstStyle/>
+                    <a:p>
+                      <a:r>
+                        <a:rPr lang="es-MX" dirty="0"/>
+                        <a:t>Desarrollador </a:t>
+                      </a:r>
+                      <a:r>
+                        <a:rPr lang="es-MX" dirty="0" err="1"/>
+                        <a:t>MuleSoft</a:t>
+                      </a:r>
+                      <a:r>
+                        <a:rPr lang="es-MX" dirty="0"/>
+                        <a:t> Junior</a:t>
+                      </a:r>
+                    </a:p>
+                  </a:txBody>
+                  <a:tcPr/>
+                </a:tc>
+                <a:tc>
+                  <a:txBody>
+                    <a:bodyPr/>
+                    <a:lstStyle/>
+                    <a:p>
+                      <a:r>
+                        <a:rPr lang="es-MX" dirty="0"/>
+                        <a:t>1 mes</a:t>
+                      </a:r>
+                    </a:p>
+                  </a:txBody>
+                  <a:tcPr/>
+                </a:tc>
+                <a:tc>
+                  <a:txBody>
+                    <a:bodyPr/>
+                    <a:lstStyle/>
+                    <a:p>
+                      <a:r>
+                        <a:rPr lang="es-MX" dirty="0"/>
+                        <a:t>18 000 m.n.</a:t>
+                      </a:r>
+                    </a:p>
+                  </a:txBody>
+                  <a:tcPr/>
+                </a:tc>
+                <a:extLst>
+                  <a:ext uri="{0D108BD9-81ED-4DB2-BD59-A6C34878D82A}">
+                    <a16:rowId xmlns:a16="http://schemas.microsoft.com/office/drawing/2014/main" val="991567531"/>
+                  </a:ext>
+                </a:extLst>
+              </a:tr>
+              <a:tr h="267967">
+                <a:tc>
+                  <a:txBody>
+                    <a:bodyPr/>
+                    <a:lstStyle/>
+                    <a:p>
+                      <a:r>
+                        <a:rPr lang="es-MX" dirty="0"/>
+                        <a:t>Desarrollador </a:t>
+                      </a:r>
+                      <a:r>
+                        <a:rPr lang="es-MX" dirty="0" err="1"/>
+                        <a:t>Frontend</a:t>
+                      </a:r>
+                      <a:endParaRPr lang="es-MX" dirty="0"/>
+                    </a:p>
+                  </a:txBody>
+                  <a:tcPr/>
+                </a:tc>
+                <a:tc>
+                  <a:txBody>
+                    <a:bodyPr/>
+                    <a:lstStyle/>
+                    <a:p>
+                      <a:r>
+                        <a:rPr lang="es-MX" dirty="0"/>
+                        <a:t>2 Semanas</a:t>
+                      </a:r>
+                    </a:p>
+                  </a:txBody>
+                  <a:tcPr/>
+                </a:tc>
+                <a:tc>
+                  <a:txBody>
+                    <a:bodyPr/>
+                    <a:lstStyle/>
+                    <a:p>
+                      <a:r>
+                        <a:rPr lang="es-MX" dirty="0"/>
+                        <a:t>11 000 m.n.</a:t>
+                      </a:r>
+                    </a:p>
+                  </a:txBody>
+                  <a:tcPr/>
+                </a:tc>
+                <a:extLst>
+                  <a:ext uri="{0D108BD9-81ED-4DB2-BD59-A6C34878D82A}">
+                    <a16:rowId xmlns:a16="http://schemas.microsoft.com/office/drawing/2014/main" val="3391109225"/>
+                  </a:ext>
+                </a:extLst>
+              </a:tr>
+              <a:tr h="268389">
+                <a:tc>
+                  <a:txBody>
+                    <a:bodyPr/>
+                    <a:lstStyle/>
+                    <a:p>
+                      <a:r>
+                        <a:rPr lang="es-MX" dirty="0"/>
+                        <a:t>Desarrollador de Base de Datos</a:t>
+                      </a:r>
+                    </a:p>
+                  </a:txBody>
+                  <a:tcPr/>
+                </a:tc>
+                <a:tc>
+                  <a:txBody>
+                    <a:bodyPr/>
+                    <a:lstStyle/>
+                    <a:p>
+                      <a:r>
+                        <a:rPr lang="es-MX" dirty="0"/>
+                        <a:t>2 Semanas</a:t>
+                      </a:r>
+                    </a:p>
+                  </a:txBody>
+                  <a:tcPr/>
+                </a:tc>
+                <a:tc>
+                  <a:txBody>
+                    <a:bodyPr/>
+                    <a:lstStyle/>
+                    <a:p>
+                      <a:r>
+                        <a:rPr lang="es-MX" dirty="0"/>
+                        <a:t>10 000 m.n.</a:t>
+                      </a:r>
+                    </a:p>
+                  </a:txBody>
+                  <a:tcPr/>
+                </a:tc>
+                <a:extLst>
+                  <a:ext uri="{0D108BD9-81ED-4DB2-BD59-A6C34878D82A}">
+                    <a16:rowId xmlns:a16="http://schemas.microsoft.com/office/drawing/2014/main" val="2889177569"/>
+                  </a:ext>
+                </a:extLst>
+              </a:tr>
+              <a:tr h="468942">
+                <a:tc>
+                  <a:txBody>
+                    <a:bodyPr/>
+                    <a:lstStyle/>
+                    <a:p>
+                      <a:endParaRPr lang="es-MX" dirty="0"/>
+                    </a:p>
+                  </a:txBody>
+                  <a:tcPr/>
+                </a:tc>
+                <a:tc>
+                  <a:txBody>
+                    <a:bodyPr/>
+                    <a:lstStyle/>
+                    <a:p>
+                      <a:pPr marL="0" marR="0" lvl="0" indent="0" algn="l" defTabSz="914400" rtl="0" eaLnBrk="1" fontAlgn="auto" latinLnBrk="0" hangingPunct="1">
+                        <a:lnSpc>
+                          <a:spcPct val="100000"/>
+                        </a:lnSpc>
+                        <a:spcBef>
+                          <a:spcPts val="0"/>
+                        </a:spcBef>
+                        <a:spcAft>
+                          <a:spcPts val="0"/>
+                        </a:spcAft>
+                        <a:buClrTx/>
+                        <a:buSzTx/>
+                        <a:buFontTx/>
+                        <a:buNone/>
+                        <a:tabLst/>
+                        <a:defRPr/>
+                      </a:pPr>
+                      <a:r>
+                        <a:rPr lang="es-MX" dirty="0"/>
+                        <a:t>2 meses</a:t>
+                      </a:r>
+                    </a:p>
+                    <a:p>
+                      <a:endParaRPr lang="es-MX" dirty="0"/>
+                    </a:p>
+                  </a:txBody>
+                  <a:tcPr/>
+                </a:tc>
+                <a:tc>
+                  <a:txBody>
+                    <a:bodyPr/>
+                    <a:lstStyle/>
+                    <a:p>
+                      <a:pPr marL="0" marR="0" lvl="0" indent="0" algn="l" defTabSz="914400" rtl="0" eaLnBrk="1" fontAlgn="auto" latinLnBrk="0" hangingPunct="1">
+                        <a:lnSpc>
+                          <a:spcPct val="100000"/>
+                        </a:lnSpc>
+                        <a:spcBef>
+                          <a:spcPts val="0"/>
+                        </a:spcBef>
+                        <a:spcAft>
+                          <a:spcPts val="0"/>
+                        </a:spcAft>
+                        <a:buClrTx/>
+                        <a:buSzTx/>
+                        <a:buFontTx/>
+                        <a:buNone/>
+                        <a:tabLst/>
+                        <a:defRPr/>
+                      </a:pPr>
+                      <a:r>
+                        <a:rPr lang="es-MX" dirty="0"/>
+                        <a:t>39 000 m.n.</a:t>
+                      </a:r>
+                    </a:p>
+                    <a:p>
+                      <a:endParaRPr lang="es-MX" dirty="0"/>
+                    </a:p>
+                  </a:txBody>
+                  <a:tcPr/>
+                </a:tc>
+                <a:extLst>
+                  <a:ext uri="{0D108BD9-81ED-4DB2-BD59-A6C34878D82A}">
+                    <a16:rowId xmlns:a16="http://schemas.microsoft.com/office/drawing/2014/main" val="1403433740"/>
+                  </a:ext>
+                </a:extLst>
+              </a:tr>
+            </a:tbl>
+          </a:graphicData>
+        </a:graphic>
+      </p:graphicFrame>
+    </p:spTree>
+    <p:extLst>
+      <p:ext uri="{BB962C8B-B14F-4D97-AF65-F5344CB8AC3E}">
+        <p14:creationId xmlns:p14="http://schemas.microsoft.com/office/powerpoint/2010/main" val="2376064531"/>
+      </p:ext>
+    </p:extLst>
+  </p:cSld>
+  <p:clrMapOvr>
+    <a:masterClrMapping/>
+  </p:clrMapOvr>
+</p:sld>
+</file>
+
+<file path=ppt/slides/slide15.xml><?xml version="1.0" encoding="utf-8"?>
+<p:sld xmlns:a="http://schemas.openxmlformats.org/drawingml/2006/main" xmlns:r="http://schemas.openxmlformats.org/officeDocument/2006/relationships" xmlns:p="http://schemas.openxmlformats.org/presentationml/2006/main">
+  <p:cSld>
+    <p:spTree>
+      <p:nvGrpSpPr>
+        <p:cNvPr id="1" name=""/>
+        <p:cNvGrpSpPr/>
+        <p:nvPr/>
+      </p:nvGrpSpPr>
+      <p:grpSpPr>
+        <a:xfrm>
+          <a:off x="0" y="0"/>
+          <a:ext cx="0" cy="0"/>
+          <a:chOff x="0" y="0"/>
+          <a:chExt cx="0" cy="0"/>
+        </a:xfrm>
+      </p:grpSpPr>
+      <p:sp>
+        <p:nvSpPr>
+          <p:cNvPr id="2" name="Título 1">
+            <a:extLst>
+              <a:ext uri="{FF2B5EF4-FFF2-40B4-BE49-F238E27FC236}">
+                <a16:creationId xmlns:a16="http://schemas.microsoft.com/office/drawing/2014/main" id="{C19C754B-2B5D-4D0F-A194-F02913056840}"/>
+              </a:ext>
+            </a:extLst>
+          </p:cNvPr>
+          <p:cNvSpPr>
+            <a:spLocks noGrp="1"/>
+          </p:cNvSpPr>
+          <p:nvPr>
+            <p:ph type="title"/>
+          </p:nvPr>
+        </p:nvSpPr>
+        <p:spPr>
+          <a:xfrm>
+            <a:off x="838200" y="767086"/>
+            <a:ext cx="10515600" cy="1170712"/>
+          </a:xfrm>
+        </p:spPr>
+        <p:txBody>
+          <a:bodyPr>
+            <a:normAutofit fontScale="90000"/>
+          </a:bodyPr>
+          <a:lstStyle/>
+          <a:p>
+            <a:r>
+              <a:rPr lang="es-MX" b="1" dirty="0">
+                <a:solidFill>
+                  <a:srgbClr val="16212F"/>
+                </a:solidFill>
+                <a:effectLst/>
+              </a:rPr>
+              <a:t>Conclusión</a:t>
+            </a:r>
+            <a:br>
+              <a:rPr lang="es-MX" b="1" dirty="0"/>
+            </a:br>
+            <a:endParaRPr lang="es-MX" dirty="0"/>
+          </a:p>
+        </p:txBody>
+      </p:sp>
+      <p:sp>
+        <p:nvSpPr>
+          <p:cNvPr id="3" name="Marcador de contenido 2">
+            <a:extLst>
+              <a:ext uri="{FF2B5EF4-FFF2-40B4-BE49-F238E27FC236}">
+                <a16:creationId xmlns:a16="http://schemas.microsoft.com/office/drawing/2014/main" id="{83CB34CC-D95B-4F97-975B-D2E03BD980F8}"/>
+              </a:ext>
+            </a:extLst>
+          </p:cNvPr>
+          <p:cNvSpPr>
+            <a:spLocks noGrp="1"/>
+          </p:cNvSpPr>
+          <p:nvPr>
+            <p:ph idx="1"/>
+          </p:nvPr>
+        </p:nvSpPr>
+        <p:spPr>
+          <a:xfrm>
+            <a:off x="838200" y="1937798"/>
+            <a:ext cx="10515600" cy="2426779"/>
+          </a:xfrm>
+          <a:solidFill>
+            <a:schemeClr val="accent1"/>
+          </a:solidFill>
+        </p:spPr>
+        <p:txBody>
+          <a:bodyPr/>
+          <a:lstStyle/>
+          <a:p>
+            <a:pPr marL="0" indent="0">
+              <a:buNone/>
+            </a:pPr>
+            <a:r>
+              <a:rPr lang="es-MX" dirty="0" err="1">
+                <a:solidFill>
+                  <a:srgbClr val="FFFF00"/>
+                </a:solidFill>
+                <a:effectLst/>
+              </a:rPr>
+              <a:t>MuleSoft</a:t>
+            </a:r>
+            <a:r>
+              <a:rPr lang="es-MX" dirty="0">
+                <a:solidFill>
+                  <a:srgbClr val="FFFF00"/>
+                </a:solidFill>
+                <a:effectLst/>
+              </a:rPr>
+              <a:t> es la herramienta perfecta para la orquestación de las comunicaciones entre múltiples sistemas, permite disponer de un </a:t>
+            </a:r>
+            <a:r>
+              <a:rPr lang="es-MX" b="1" dirty="0">
+                <a:solidFill>
+                  <a:srgbClr val="FFFF00"/>
+                </a:solidFill>
+                <a:effectLst/>
+              </a:rPr>
+              <a:t>punto común donde gestionar todas las integraciones</a:t>
+            </a:r>
+            <a:r>
+              <a:rPr lang="es-MX" dirty="0">
+                <a:solidFill>
+                  <a:srgbClr val="FFFF00"/>
+                </a:solidFill>
+                <a:effectLst/>
+              </a:rPr>
+              <a:t> de nuestro ecosistema de aplicaciones sin necesidad de tener conocimientos técnicos avanzados, abstrayéndose en cierta medida, de la tecnología utilizada.</a:t>
+            </a:r>
+            <a:endParaRPr lang="es-MX" dirty="0">
+              <a:solidFill>
+                <a:srgbClr val="FFFF00"/>
+              </a:solidFill>
+            </a:endParaRPr>
+          </a:p>
+          <a:p>
+            <a:endParaRPr lang="es-MX" dirty="0"/>
+          </a:p>
+        </p:txBody>
+      </p:sp>
+    </p:spTree>
+    <p:extLst>
+      <p:ext uri="{BB962C8B-B14F-4D97-AF65-F5344CB8AC3E}">
+        <p14:creationId xmlns:p14="http://schemas.microsoft.com/office/powerpoint/2010/main" val="3814367451"/>
+      </p:ext>
+    </p:extLst>
+  </p:cSld>
+  <p:clrMapOvr>
+    <a:masterClrMapping/>
+  </p:clrMapOvr>
+</p:sld>
+</file>
+
+<file path=ppt/slides/slide16.xml><?xml version="1.0" encoding="utf-8"?>
 <p:sld xmlns:a="http://schemas.openxmlformats.org/drawingml/2006/main" xmlns:r="http://schemas.openxmlformats.org/officeDocument/2006/relationships" xmlns:p="http://schemas.openxmlformats.org/presentationml/2006/main">
   <p:cSld>
     <p:spTree>
@@ -6896,7 +7439,7 @@
         </p:blipFill>
         <p:spPr bwMode="auto">
           <a:xfrm>
-            <a:off x="576495" y="2467401"/>
+            <a:off x="768032" y="2466475"/>
             <a:ext cx="1160865" cy="1024411"/>
           </a:xfrm>
           <a:prstGeom prst="rect">
@@ -7403,16 +7946,49 @@
         </p:blipFill>
         <p:spPr bwMode="auto">
           <a:xfrm>
-            <a:off x="5369495" y="5393323"/>
+            <a:off x="5365614" y="5409387"/>
             <a:ext cx="858918" cy="1189272"/>
           </a:xfrm>
           <a:prstGeom prst="rect">
             <a:avLst/>
           </a:prstGeom>
-          <a:noFill/>
+          <a:blipFill>
+            <a:blip r:embed="rId16"/>
+            <a:tile tx="0" ty="0" sx="100000" sy="100000" flip="none" algn="tl"/>
+          </a:blipFill>
           <a:ln>
             <a:noFill/>
           </a:ln>
+        </p:spPr>
+      </p:pic>
+      <p:pic>
+        <p:nvPicPr>
+          <p:cNvPr id="4" name="Imagen 3">
+            <a:extLst>
+              <a:ext uri="{FF2B5EF4-FFF2-40B4-BE49-F238E27FC236}">
+                <a16:creationId xmlns:a16="http://schemas.microsoft.com/office/drawing/2014/main" id="{432CB115-9A65-4104-A124-A3714CAA46CD}"/>
+              </a:ext>
+            </a:extLst>
+          </p:cNvPr>
+          <p:cNvPicPr>
+            <a:picLocks noChangeAspect="1"/>
+          </p:cNvPicPr>
+          <p:nvPr/>
+        </p:nvPicPr>
+        <p:blipFill>
+          <a:blip r:embed="rId17"/>
+          <a:stretch>
+            <a:fillRect/>
+          </a:stretch>
+        </p:blipFill>
+        <p:spPr>
+          <a:xfrm>
+            <a:off x="682693" y="2456161"/>
+            <a:ext cx="10925175" cy="4229100"/>
+          </a:xfrm>
+          <a:prstGeom prst="rect">
+            <a:avLst/>
+          </a:prstGeom>
         </p:spPr>
       </p:pic>
     </p:spTree>
@@ -7483,21 +8059,44 @@
           </a:p>
         </p:txBody>
       </p:sp>
+      <p:sp>
+        <p:nvSpPr>
+          <p:cNvPr id="4" name="Marcador de contenido 3">
+            <a:extLst>
+              <a:ext uri="{FF2B5EF4-FFF2-40B4-BE49-F238E27FC236}">
+                <a16:creationId xmlns:a16="http://schemas.microsoft.com/office/drawing/2014/main" id="{636782D3-5CE4-4776-89CE-4985A547A875}"/>
+              </a:ext>
+            </a:extLst>
+          </p:cNvPr>
+          <p:cNvSpPr>
+            <a:spLocks noGrp="1"/>
+          </p:cNvSpPr>
+          <p:nvPr>
+            <p:ph idx="1"/>
+          </p:nvPr>
+        </p:nvSpPr>
+        <p:spPr/>
+        <p:txBody>
+          <a:bodyPr/>
+          <a:lstStyle/>
+          <a:p>
+            <a:endParaRPr lang="es-MX"/>
+          </a:p>
+        </p:txBody>
+      </p:sp>
       <p:pic>
         <p:nvPicPr>
-          <p:cNvPr id="5" name="Marcador de contenido 4">
-            <a:extLst>
-              <a:ext uri="{FF2B5EF4-FFF2-40B4-BE49-F238E27FC236}">
-                <a16:creationId xmlns:a16="http://schemas.microsoft.com/office/drawing/2014/main" id="{C154564C-89C8-4BC1-8197-A875EAC27356}"/>
+          <p:cNvPr id="9" name="Imagen 8">
+            <a:extLst>
+              <a:ext uri="{FF2B5EF4-FFF2-40B4-BE49-F238E27FC236}">
+                <a16:creationId xmlns:a16="http://schemas.microsoft.com/office/drawing/2014/main" id="{77FE7C34-10F7-45D5-9516-648C74996897}"/>
               </a:ext>
             </a:extLst>
           </p:cNvPr>
           <p:cNvPicPr>
-            <a:picLocks noGrp="1" noChangeAspect="1"/>
+            <a:picLocks noChangeAspect="1"/>
           </p:cNvPicPr>
-          <p:nvPr>
-            <p:ph idx="1"/>
-          </p:nvPr>
+          <p:nvPr/>
         </p:nvPicPr>
         <p:blipFill>
           <a:blip r:embed="rId2"/>
@@ -7507,9 +8106,12 @@
         </p:blipFill>
         <p:spPr>
           <a:xfrm>
-            <a:off x="904875" y="1690688"/>
-            <a:ext cx="10382250" cy="4510390"/>
+            <a:off x="690562" y="1690688"/>
+            <a:ext cx="10810875" cy="4457700"/>
           </a:xfrm>
+          <a:prstGeom prst="rect">
+            <a:avLst/>
+          </a:prstGeom>
         </p:spPr>
       </p:pic>
     </p:spTree>
@@ -7542,12 +8144,54 @@
           <a:chExt cx="0" cy="0"/>
         </a:xfrm>
       </p:grpSpPr>
+      <p:sp>
+        <p:nvSpPr>
+          <p:cNvPr id="3" name="Título 1">
+            <a:extLst>
+              <a:ext uri="{FF2B5EF4-FFF2-40B4-BE49-F238E27FC236}">
+                <a16:creationId xmlns:a16="http://schemas.microsoft.com/office/drawing/2014/main" id="{4A1905D5-5ADC-465C-A6A4-07026BBFB538}"/>
+              </a:ext>
+            </a:extLst>
+          </p:cNvPr>
+          <p:cNvSpPr>
+            <a:spLocks noGrp="1"/>
+          </p:cNvSpPr>
+          <p:nvPr>
+            <p:ph type="title"/>
+          </p:nvPr>
+        </p:nvSpPr>
+        <p:spPr>
+          <a:xfrm>
+            <a:off x="838200" y="365125"/>
+            <a:ext cx="10515600" cy="1325563"/>
+          </a:xfrm>
+        </p:spPr>
+        <p:txBody>
+          <a:bodyPr>
+            <a:normAutofit/>
+          </a:bodyPr>
+          <a:lstStyle/>
+          <a:p>
+            <a:r>
+              <a:rPr lang="es-MX" sz="3200" b="1" dirty="0">
+                <a:latin typeface="Arial" panose="020B0604020202020204" pitchFamily="34" charset="0"/>
+                <a:cs typeface="Arial" panose="020B0604020202020204" pitchFamily="34" charset="0"/>
+              </a:rPr>
+              <a:t>Área de oportunidad</a:t>
+            </a:r>
+            <a:endParaRPr lang="es-MX" sz="4000" b="1" dirty="0">
+              <a:latin typeface="Arial" panose="020B0604020202020204" pitchFamily="34" charset="0"/>
+              <a:cs typeface="Arial" panose="020B0604020202020204" pitchFamily="34" charset="0"/>
+            </a:endParaRPr>
+          </a:p>
+        </p:txBody>
+      </p:sp>
       <p:pic>
         <p:nvPicPr>
-          <p:cNvPr id="9" name="Imagen 8">
-            <a:extLst>
-              <a:ext uri="{FF2B5EF4-FFF2-40B4-BE49-F238E27FC236}">
-                <a16:creationId xmlns:a16="http://schemas.microsoft.com/office/drawing/2014/main" id="{0AA9C0F7-9452-4719-B467-DF198974E3F3}"/>
+          <p:cNvPr id="4" name="Imagen 3">
+            <a:extLst>
+              <a:ext uri="{FF2B5EF4-FFF2-40B4-BE49-F238E27FC236}">
+                <a16:creationId xmlns:a16="http://schemas.microsoft.com/office/drawing/2014/main" id="{7ECBDC5C-5ED3-42AA-9202-F19D3EBEA68D}"/>
               </a:ext>
             </a:extLst>
           </p:cNvPr>
@@ -7564,56 +8208,14 @@
         </p:blipFill>
         <p:spPr>
           <a:xfrm>
-            <a:off x="762000" y="1505816"/>
-            <a:ext cx="10668000" cy="4651169"/>
+            <a:off x="838200" y="1605791"/>
+            <a:ext cx="10658475" cy="4600575"/>
           </a:xfrm>
           <a:prstGeom prst="rect">
             <a:avLst/>
           </a:prstGeom>
         </p:spPr>
       </p:pic>
-      <p:sp>
-        <p:nvSpPr>
-          <p:cNvPr id="3" name="Título 1">
-            <a:extLst>
-              <a:ext uri="{FF2B5EF4-FFF2-40B4-BE49-F238E27FC236}">
-                <a16:creationId xmlns:a16="http://schemas.microsoft.com/office/drawing/2014/main" id="{4A1905D5-5ADC-465C-A6A4-07026BBFB538}"/>
-              </a:ext>
-            </a:extLst>
-          </p:cNvPr>
-          <p:cNvSpPr>
-            <a:spLocks noGrp="1"/>
-          </p:cNvSpPr>
-          <p:nvPr>
-            <p:ph type="title"/>
-          </p:nvPr>
-        </p:nvSpPr>
-        <p:spPr>
-          <a:xfrm>
-            <a:off x="838200" y="365125"/>
-            <a:ext cx="10515600" cy="1325563"/>
-          </a:xfrm>
-        </p:spPr>
-        <p:txBody>
-          <a:bodyPr>
-            <a:normAutofit/>
-          </a:bodyPr>
-          <a:lstStyle/>
-          <a:p>
-            <a:r>
-              <a:rPr lang="es-MX" sz="3200" b="1" dirty="0">
-                <a:latin typeface="Arial" panose="020B0604020202020204" pitchFamily="34" charset="0"/>
-                <a:cs typeface="Arial" panose="020B0604020202020204" pitchFamily="34" charset="0"/>
-              </a:rPr>
-              <a:t>Área de oportunidad</a:t>
-            </a:r>
-            <a:endParaRPr lang="es-MX" sz="4000" b="1" dirty="0">
-              <a:latin typeface="Arial" panose="020B0604020202020204" pitchFamily="34" charset="0"/>
-              <a:cs typeface="Arial" panose="020B0604020202020204" pitchFamily="34" charset="0"/>
-            </a:endParaRPr>
-          </a:p>
-        </p:txBody>
-      </p:sp>
     </p:spTree>
     <p:extLst>
       <p:ext uri="{BB962C8B-B14F-4D97-AF65-F5344CB8AC3E}">
@@ -7644,12 +8246,118 @@
           <a:chExt cx="0" cy="0"/>
         </a:xfrm>
       </p:grpSpPr>
+      <p:sp>
+        <p:nvSpPr>
+          <p:cNvPr id="2" name="Título 1">
+            <a:extLst>
+              <a:ext uri="{FF2B5EF4-FFF2-40B4-BE49-F238E27FC236}">
+                <a16:creationId xmlns:a16="http://schemas.microsoft.com/office/drawing/2014/main" id="{6C059025-58AC-41FF-9A24-0F166E240B2B}"/>
+              </a:ext>
+            </a:extLst>
+          </p:cNvPr>
+          <p:cNvSpPr>
+            <a:spLocks noGrp="1"/>
+          </p:cNvSpPr>
+          <p:nvPr>
+            <p:ph type="title"/>
+          </p:nvPr>
+        </p:nvSpPr>
+        <p:spPr/>
+        <p:txBody>
+          <a:bodyPr/>
+          <a:lstStyle/>
+          <a:p>
+            <a:r>
+              <a:rPr lang="es-MX" b="1" dirty="0">
+                <a:solidFill>
+                  <a:srgbClr val="16212F"/>
+                </a:solidFill>
+                <a:effectLst/>
+              </a:rPr>
+              <a:t>¿qué es la conectividad </a:t>
+            </a:r>
+            <a:r>
+              <a:rPr lang="es-MX" dirty="0">
+                <a:solidFill>
+                  <a:srgbClr val="000000"/>
+                </a:solidFill>
+                <a:effectLst/>
+              </a:rPr>
+              <a:t>API-Led</a:t>
+            </a:r>
+            <a:r>
+              <a:rPr lang="es-MX" b="1" dirty="0">
+                <a:solidFill>
+                  <a:srgbClr val="16212F"/>
+                </a:solidFill>
+                <a:effectLst/>
+              </a:rPr>
+              <a:t>?</a:t>
+            </a:r>
+            <a:br>
+              <a:rPr lang="es-MX" dirty="0"/>
+            </a:br>
+            <a:endParaRPr lang="es-MX" dirty="0"/>
+          </a:p>
+        </p:txBody>
+      </p:sp>
+      <p:sp>
+        <p:nvSpPr>
+          <p:cNvPr id="3" name="Marcador de contenido 2">
+            <a:extLst>
+              <a:ext uri="{FF2B5EF4-FFF2-40B4-BE49-F238E27FC236}">
+                <a16:creationId xmlns:a16="http://schemas.microsoft.com/office/drawing/2014/main" id="{D70C8158-0B96-442C-A94C-6BA172E19AE0}"/>
+              </a:ext>
+            </a:extLst>
+          </p:cNvPr>
+          <p:cNvSpPr>
+            <a:spLocks noGrp="1"/>
+          </p:cNvSpPr>
+          <p:nvPr>
+            <p:ph idx="1"/>
+          </p:nvPr>
+        </p:nvSpPr>
+        <p:spPr>
+          <a:xfrm>
+            <a:off x="72888" y="1027905"/>
+            <a:ext cx="12192000" cy="962819"/>
+          </a:xfrm>
+          <a:solidFill>
+            <a:srgbClr val="0070C0"/>
+          </a:solidFill>
+        </p:spPr>
+        <p:txBody>
+          <a:bodyPr>
+            <a:normAutofit/>
+          </a:bodyPr>
+          <a:lstStyle/>
+          <a:p>
+            <a:pPr marL="0" indent="0">
+              <a:buNone/>
+            </a:pPr>
+            <a:r>
+              <a:rPr lang="es-MX" dirty="0">
+                <a:solidFill>
+                  <a:srgbClr val="FFFF00"/>
+                </a:solidFill>
+                <a:effectLst/>
+              </a:rPr>
+              <a:t>El objetivo principal de la conectividad API-Led es habilitar la integración de flujos para ser reutilizados por la plataforma de integración, agentes internos o externos. </a:t>
+            </a:r>
+            <a:endParaRPr lang="es-MX" dirty="0">
+              <a:solidFill>
+                <a:srgbClr val="FFFF00"/>
+              </a:solidFill>
+            </a:endParaRPr>
+          </a:p>
+        </p:txBody>
+      </p:sp>
       <p:pic>
         <p:nvPicPr>
-          <p:cNvPr id="5" name="Imagen 4">
-            <a:extLst>
-              <a:ext uri="{FF2B5EF4-FFF2-40B4-BE49-F238E27FC236}">
-                <a16:creationId xmlns:a16="http://schemas.microsoft.com/office/drawing/2014/main" id="{4DB9A338-56B0-466B-8E7A-0F801AB6009D}"/>
+          <p:cNvPr id="6" name="Imagen 5">
+            <a:extLst>
+              <a:ext uri="{FF2B5EF4-FFF2-40B4-BE49-F238E27FC236}">
+                <a16:creationId xmlns:a16="http://schemas.microsoft.com/office/drawing/2014/main" id="{6BAF1C6F-E605-4183-92EF-865C078F898E}"/>
               </a:ext>
             </a:extLst>
           </p:cNvPr>
@@ -7666,120 +8374,14 @@
         </p:blipFill>
         <p:spPr>
           <a:xfrm>
-            <a:off x="0" y="1775064"/>
-            <a:ext cx="12192000" cy="5076278"/>
+            <a:off x="0" y="1990724"/>
+            <a:ext cx="12153900" cy="4867275"/>
           </a:xfrm>
           <a:prstGeom prst="rect">
             <a:avLst/>
           </a:prstGeom>
         </p:spPr>
       </p:pic>
-      <p:sp>
-        <p:nvSpPr>
-          <p:cNvPr id="2" name="Título 1">
-            <a:extLst>
-              <a:ext uri="{FF2B5EF4-FFF2-40B4-BE49-F238E27FC236}">
-                <a16:creationId xmlns:a16="http://schemas.microsoft.com/office/drawing/2014/main" id="{6C059025-58AC-41FF-9A24-0F166E240B2B}"/>
-              </a:ext>
-            </a:extLst>
-          </p:cNvPr>
-          <p:cNvSpPr>
-            <a:spLocks noGrp="1"/>
-          </p:cNvSpPr>
-          <p:nvPr>
-            <p:ph type="title"/>
-          </p:nvPr>
-        </p:nvSpPr>
-        <p:spPr/>
-        <p:txBody>
-          <a:bodyPr/>
-          <a:lstStyle/>
-          <a:p>
-            <a:r>
-              <a:rPr lang="es-MX" b="1" dirty="0">
-                <a:solidFill>
-                  <a:srgbClr val="16212F"/>
-                </a:solidFill>
-                <a:effectLst/>
-              </a:rPr>
-              <a:t>¿qué es la conectividad </a:t>
-            </a:r>
-            <a:r>
-              <a:rPr lang="es-MX" dirty="0">
-                <a:solidFill>
-                  <a:srgbClr val="000000"/>
-                </a:solidFill>
-                <a:effectLst/>
-              </a:rPr>
-              <a:t>API-Led</a:t>
-            </a:r>
-            <a:r>
-              <a:rPr lang="es-MX" b="1" dirty="0">
-                <a:solidFill>
-                  <a:srgbClr val="16212F"/>
-                </a:solidFill>
-                <a:effectLst/>
-              </a:rPr>
-              <a:t>?</a:t>
-            </a:r>
-            <a:br>
-              <a:rPr lang="es-MX" dirty="0"/>
-            </a:br>
-            <a:endParaRPr lang="es-MX" dirty="0"/>
-          </a:p>
-        </p:txBody>
-      </p:sp>
-      <p:sp>
-        <p:nvSpPr>
-          <p:cNvPr id="3" name="Marcador de contenido 2">
-            <a:extLst>
-              <a:ext uri="{FF2B5EF4-FFF2-40B4-BE49-F238E27FC236}">
-                <a16:creationId xmlns:a16="http://schemas.microsoft.com/office/drawing/2014/main" id="{D70C8158-0B96-442C-A94C-6BA172E19AE0}"/>
-              </a:ext>
-            </a:extLst>
-          </p:cNvPr>
-          <p:cNvSpPr>
-            <a:spLocks noGrp="1"/>
-          </p:cNvSpPr>
-          <p:nvPr>
-            <p:ph idx="1"/>
-          </p:nvPr>
-        </p:nvSpPr>
-        <p:spPr>
-          <a:xfrm>
-            <a:off x="72888" y="1027905"/>
-            <a:ext cx="12192000" cy="962819"/>
-          </a:xfrm>
-          <a:solidFill>
-            <a:srgbClr val="0070C0"/>
-          </a:solidFill>
-        </p:spPr>
-        <p:txBody>
-          <a:bodyPr>
-            <a:normAutofit/>
-          </a:bodyPr>
-          <a:lstStyle/>
-          <a:p>
-            <a:pPr marL="0" indent="0">
-              <a:buNone/>
-            </a:pPr>
-            <a:r>
-              <a:rPr lang="es-MX" dirty="0">
-                <a:solidFill>
-                  <a:srgbClr val="FFFF00"/>
-                </a:solidFill>
-                <a:effectLst/>
-              </a:rPr>
-              <a:t>El objetivo principal de la conectividad API-Led es habilitar la integración de flujos para ser reutilizados por la plataforma de integración, agentes internos o externos. </a:t>
-            </a:r>
-            <a:endParaRPr lang="es-MX" dirty="0">
-              <a:solidFill>
-                <a:srgbClr val="FFFF00"/>
-              </a:solidFill>
-            </a:endParaRPr>
-          </a:p>
-        </p:txBody>
-      </p:sp>
     </p:spTree>
     <p:extLst>
       <p:ext uri="{BB962C8B-B14F-4D97-AF65-F5344CB8AC3E}">
@@ -7900,10 +8502,10 @@
       </p:sp>
       <p:pic>
         <p:nvPicPr>
-          <p:cNvPr id="5" name="Imagen 4">
-            <a:extLst>
-              <a:ext uri="{FF2B5EF4-FFF2-40B4-BE49-F238E27FC236}">
-                <a16:creationId xmlns:a16="http://schemas.microsoft.com/office/drawing/2014/main" id="{FCA01138-C1BD-4E38-9218-5CC710792140}"/>
+          <p:cNvPr id="6" name="Imagen 5">
+            <a:extLst>
+              <a:ext uri="{FF2B5EF4-FFF2-40B4-BE49-F238E27FC236}">
+                <a16:creationId xmlns:a16="http://schemas.microsoft.com/office/drawing/2014/main" id="{3921A13A-9DAD-4202-8360-8FAA2ACA8A73}"/>
               </a:ext>
             </a:extLst>
           </p:cNvPr>
@@ -7920,8 +8522,8 @@
         </p:blipFill>
         <p:spPr>
           <a:xfrm>
-            <a:off x="2569669" y="1310323"/>
-            <a:ext cx="7052662" cy="2982890"/>
+            <a:off x="2571750" y="1152525"/>
+            <a:ext cx="7048500" cy="2971800"/>
           </a:xfrm>
           <a:prstGeom prst="rect">
             <a:avLst/>
@@ -8074,12 +8676,6 @@
             </a:pPr>
             <a:r>
               <a:rPr lang="es-MX" sz="2400" b="1" dirty="0">
-                <a:solidFill>
-                  <a:schemeClr val="accent6">
-                    <a:lumMod val="60000"/>
-                    <a:lumOff val="40000"/>
-                  </a:schemeClr>
-                </a:solidFill>
                 <a:effectLst/>
                 <a:latin typeface="Arial" panose="020B0604020202020204" pitchFamily="34" charset="0"/>
                 <a:cs typeface="Arial" panose="020B0604020202020204" pitchFamily="34" charset="0"/>
@@ -8088,9 +8684,6 @@
             </a:r>
             <a:r>
               <a:rPr lang="es-MX" sz="2400" dirty="0">
-                <a:solidFill>
-                  <a:srgbClr val="000000"/>
-                </a:solidFill>
                 <a:effectLst/>
                 <a:latin typeface="Arial" panose="020B0604020202020204" pitchFamily="34" charset="0"/>
                 <a:cs typeface="Arial" panose="020B0604020202020204" pitchFamily="34" charset="0"/>
@@ -8144,12 +8737,6 @@
             </a:pPr>
             <a:r>
               <a:rPr lang="es-MX" sz="2400" b="1" dirty="0">
-                <a:solidFill>
-                  <a:schemeClr val="accent6">
-                    <a:lumMod val="60000"/>
-                    <a:lumOff val="40000"/>
-                  </a:schemeClr>
-                </a:solidFill>
                 <a:effectLst/>
                 <a:latin typeface="Arial" panose="020B0604020202020204" pitchFamily="34" charset="0"/>
                 <a:cs typeface="Arial" panose="020B0604020202020204" pitchFamily="34" charset="0"/>
@@ -8158,9 +8745,6 @@
             </a:r>
             <a:r>
               <a:rPr lang="es-MX" sz="2400" dirty="0">
-                <a:solidFill>
-                  <a:srgbClr val="000000"/>
-                </a:solidFill>
                 <a:effectLst/>
                 <a:latin typeface="Arial" panose="020B0604020202020204" pitchFamily="34" charset="0"/>
                 <a:cs typeface="Arial" panose="020B0604020202020204" pitchFamily="34" charset="0"/>
@@ -8207,11 +8791,6 @@
             </a:pPr>
             <a:r>
               <a:rPr lang="es-MX" sz="2400" b="1" dirty="0">
-                <a:solidFill>
-                  <a:schemeClr val="accent1">
-                    <a:lumMod val="50000"/>
-                  </a:schemeClr>
-                </a:solidFill>
                 <a:effectLst/>
                 <a:latin typeface="Arial" panose="020B0604020202020204" pitchFamily="34" charset="0"/>
                 <a:cs typeface="Arial" panose="020B0604020202020204" pitchFamily="34" charset="0"/>
@@ -8220,27 +8799,11 @@
             </a:r>
             <a:r>
               <a:rPr lang="es-MX" sz="2400" dirty="0">
-                <a:solidFill>
-                  <a:schemeClr val="accent1">
-                    <a:lumMod val="50000"/>
-                  </a:schemeClr>
-                </a:solidFill>
                 <a:effectLst/>
                 <a:latin typeface="Arial" panose="020B0604020202020204" pitchFamily="34" charset="0"/>
                 <a:cs typeface="Arial" panose="020B0604020202020204" pitchFamily="34" charset="0"/>
               </a:rPr>
-              <a:t> </a:t>
-            </a:r>
-            <a:r>
-              <a:rPr lang="es-MX" sz="2400" dirty="0">
-                <a:solidFill>
-                  <a:srgbClr val="000000"/>
-                </a:solidFill>
-                <a:effectLst/>
-                <a:latin typeface="Arial" panose="020B0604020202020204" pitchFamily="34" charset="0"/>
-                <a:cs typeface="Arial" panose="020B0604020202020204" pitchFamily="34" charset="0"/>
-              </a:rPr>
-              <a:t>Permite a un alumno inscribirse a un curso con la clave del curso y la matricula del alumno en el cuerpo</a:t>
+              <a:t> Permite a un alumno inscribirse a un curso con la clave del curso y la matricula del alumno en el cuerpo</a:t>
             </a:r>
             <a:endParaRPr lang="es-MX" sz="2400" dirty="0">
               <a:latin typeface="Arial" panose="020B0604020202020204" pitchFamily="34" charset="0"/>
@@ -8253,9 +8816,6 @@
             </a:pPr>
             <a:r>
               <a:rPr lang="es-MX" sz="2400" b="1" dirty="0">
-                <a:solidFill>
-                  <a:srgbClr val="FF0000"/>
-                </a:solidFill>
                 <a:effectLst/>
                 <a:latin typeface="Arial" panose="020B0604020202020204" pitchFamily="34" charset="0"/>
                 <a:cs typeface="Arial" panose="020B0604020202020204" pitchFamily="34" charset="0"/>
@@ -8264,25 +8824,11 @@
             </a:r>
             <a:r>
               <a:rPr lang="es-MX" sz="2400" dirty="0">
-                <a:solidFill>
-                  <a:srgbClr val="FF0000"/>
-                </a:solidFill>
                 <a:effectLst/>
                 <a:latin typeface="Arial" panose="020B0604020202020204" pitchFamily="34" charset="0"/>
                 <a:cs typeface="Arial" panose="020B0604020202020204" pitchFamily="34" charset="0"/>
               </a:rPr>
-              <a:t> </a:t>
-            </a:r>
-            <a:r>
-              <a:rPr lang="es-MX" sz="2400" dirty="0">
-                <a:solidFill>
-                  <a:srgbClr val="000000"/>
-                </a:solidFill>
-                <a:effectLst/>
-                <a:latin typeface="Arial" panose="020B0604020202020204" pitchFamily="34" charset="0"/>
-                <a:cs typeface="Arial" panose="020B0604020202020204" pitchFamily="34" charset="0"/>
-              </a:rPr>
-              <a:t>Permite dar de baja a un alumno de un curso con la clave del curso y la matricula del alumno en el cuerpo</a:t>
+              <a:t> Permite dar de baja a un alumno de un curso con la clave del curso y la matricula del alumno en el cuerpo</a:t>
             </a:r>
             <a:endParaRPr lang="es-MX" sz="2400" dirty="0">
               <a:latin typeface="Arial" panose="020B0604020202020204" pitchFamily="34" charset="0"/>
@@ -8326,10 +8872,10 @@
       </p:grpSpPr>
       <p:pic>
         <p:nvPicPr>
-          <p:cNvPr id="6" name="Imagen 5">
-            <a:extLst>
-              <a:ext uri="{FF2B5EF4-FFF2-40B4-BE49-F238E27FC236}">
-                <a16:creationId xmlns:a16="http://schemas.microsoft.com/office/drawing/2014/main" id="{7F259348-3F3D-4627-8D1F-06F8D0BE79D4}"/>
+          <p:cNvPr id="8" name="Imagen 7">
+            <a:extLst>
+              <a:ext uri="{FF2B5EF4-FFF2-40B4-BE49-F238E27FC236}">
+                <a16:creationId xmlns:a16="http://schemas.microsoft.com/office/drawing/2014/main" id="{3E36568C-7AB1-4835-925B-14799D2A5E1D}"/>
               </a:ext>
             </a:extLst>
           </p:cNvPr>
@@ -8346,8 +8892,8 @@
         </p:blipFill>
         <p:spPr>
           <a:xfrm>
-            <a:off x="1047749" y="1188213"/>
-            <a:ext cx="10515599" cy="5681816"/>
+            <a:off x="1285875" y="1247775"/>
+            <a:ext cx="10439400" cy="5610225"/>
           </a:xfrm>
           <a:prstGeom prst="rect">
             <a:avLst/>

</xml_diff>

<commit_message>
Ultima actualizacion en la presentacion
</commit_message>
<xml_diff>
--- a/INSTITUTO POLITÉCNICO NACIONAL.pptx
+++ b/INSTITUTO POLITÉCNICO NACIONAL.pptx
@@ -274,7 +274,7 @@
           <a:p>
             <a:fld id="{3A02FAB3-715B-4700-96CD-5E0B1F22FD83}" type="datetimeFigureOut">
               <a:rPr lang="es-MX" smtClean="0"/>
-              <a:t>09/01/2021</a:t>
+              <a:t>26/02/2021</a:t>
             </a:fld>
             <a:endParaRPr lang="es-MX"/>
           </a:p>
@@ -474,7 +474,7 @@
           <a:p>
             <a:fld id="{3A02FAB3-715B-4700-96CD-5E0B1F22FD83}" type="datetimeFigureOut">
               <a:rPr lang="es-MX" smtClean="0"/>
-              <a:t>09/01/2021</a:t>
+              <a:t>26/02/2021</a:t>
             </a:fld>
             <a:endParaRPr lang="es-MX"/>
           </a:p>
@@ -684,7 +684,7 @@
           <a:p>
             <a:fld id="{3A02FAB3-715B-4700-96CD-5E0B1F22FD83}" type="datetimeFigureOut">
               <a:rPr lang="es-MX" smtClean="0"/>
-              <a:t>09/01/2021</a:t>
+              <a:t>26/02/2021</a:t>
             </a:fld>
             <a:endParaRPr lang="es-MX"/>
           </a:p>
@@ -884,7 +884,7 @@
           <a:p>
             <a:fld id="{3A02FAB3-715B-4700-96CD-5E0B1F22FD83}" type="datetimeFigureOut">
               <a:rPr lang="es-MX" smtClean="0"/>
-              <a:t>09/01/2021</a:t>
+              <a:t>26/02/2021</a:t>
             </a:fld>
             <a:endParaRPr lang="es-MX"/>
           </a:p>
@@ -1160,7 +1160,7 @@
           <a:p>
             <a:fld id="{3A02FAB3-715B-4700-96CD-5E0B1F22FD83}" type="datetimeFigureOut">
               <a:rPr lang="es-MX" smtClean="0"/>
-              <a:t>09/01/2021</a:t>
+              <a:t>26/02/2021</a:t>
             </a:fld>
             <a:endParaRPr lang="es-MX"/>
           </a:p>
@@ -1428,7 +1428,7 @@
           <a:p>
             <a:fld id="{3A02FAB3-715B-4700-96CD-5E0B1F22FD83}" type="datetimeFigureOut">
               <a:rPr lang="es-MX" smtClean="0"/>
-              <a:t>09/01/2021</a:t>
+              <a:t>26/02/2021</a:t>
             </a:fld>
             <a:endParaRPr lang="es-MX"/>
           </a:p>
@@ -1843,7 +1843,7 @@
           <a:p>
             <a:fld id="{3A02FAB3-715B-4700-96CD-5E0B1F22FD83}" type="datetimeFigureOut">
               <a:rPr lang="es-MX" smtClean="0"/>
-              <a:t>09/01/2021</a:t>
+              <a:t>26/02/2021</a:t>
             </a:fld>
             <a:endParaRPr lang="es-MX"/>
           </a:p>
@@ -1985,7 +1985,7 @@
           <a:p>
             <a:fld id="{3A02FAB3-715B-4700-96CD-5E0B1F22FD83}" type="datetimeFigureOut">
               <a:rPr lang="es-MX" smtClean="0"/>
-              <a:t>09/01/2021</a:t>
+              <a:t>26/02/2021</a:t>
             </a:fld>
             <a:endParaRPr lang="es-MX"/>
           </a:p>
@@ -2098,7 +2098,7 @@
           <a:p>
             <a:fld id="{3A02FAB3-715B-4700-96CD-5E0B1F22FD83}" type="datetimeFigureOut">
               <a:rPr lang="es-MX" smtClean="0"/>
-              <a:t>09/01/2021</a:t>
+              <a:t>26/02/2021</a:t>
             </a:fld>
             <a:endParaRPr lang="es-MX"/>
           </a:p>
@@ -2411,7 +2411,7 @@
           <a:p>
             <a:fld id="{3A02FAB3-715B-4700-96CD-5E0B1F22FD83}" type="datetimeFigureOut">
               <a:rPr lang="es-MX" smtClean="0"/>
-              <a:t>09/01/2021</a:t>
+              <a:t>26/02/2021</a:t>
             </a:fld>
             <a:endParaRPr lang="es-MX"/>
           </a:p>
@@ -2700,7 +2700,7 @@
           <a:p>
             <a:fld id="{3A02FAB3-715B-4700-96CD-5E0B1F22FD83}" type="datetimeFigureOut">
               <a:rPr lang="es-MX" smtClean="0"/>
-              <a:t>09/01/2021</a:t>
+              <a:t>26/02/2021</a:t>
             </a:fld>
             <a:endParaRPr lang="es-MX"/>
           </a:p>
@@ -2949,7 +2949,7 @@
           <a:p>
             <a:fld id="{3A02FAB3-715B-4700-96CD-5E0B1F22FD83}" type="datetimeFigureOut">
               <a:rPr lang="es-MX" smtClean="0"/>
-              <a:t>09/01/2021</a:t>
+              <a:t>26/02/2021</a:t>
             </a:fld>
             <a:endParaRPr lang="es-MX"/>
           </a:p>
@@ -3442,7 +3442,7 @@
                 <a:latin typeface="Arial" panose="020B0604020202020204" pitchFamily="34" charset="0"/>
                 <a:ea typeface="Calibri" panose="020F0502020204030204" pitchFamily="34" charset="0"/>
               </a:rPr>
-              <a:t>SISTEMA DE GESTIÓN ESCOLAR QUE PERMITA LA ADMINISTRACIÓN DE PERSONAL DOCENTE Y ESTUDIANTIL PERSONAL ADMINISTRATIVO DENTRO DE UNA INSTITUCIÓN ACADÉMICA DE MANERA REMOTA</a:t>
+              <a:t>SISTEMA DE GESTIÓN ESCOLAR QUE PERMITA LA ADMINISTRACIÓN DE PERSONAL DOCENTE, ADMINISTRATIVO Y ESTUDIANTIL DENTRO DE UNA INSTITUCIÓN ACADÉMICA DE MANERA REMOTA</a:t>
             </a:r>
             <a:endParaRPr lang="es-MX" sz="3200" i="1" dirty="0"/>
           </a:p>
@@ -3645,7 +3645,7 @@
         <p:spPr>
           <a:xfrm>
             <a:off x="3484484" y="5160799"/>
-            <a:ext cx="5734975" cy="1754326"/>
+            <a:ext cx="5734975" cy="1477328"/>
           </a:xfrm>
           <a:prstGeom prst="rect">
             <a:avLst/>
@@ -3657,12 +3657,6 @@
             <a:spAutoFit/>
           </a:bodyPr>
           <a:lstStyle/>
-          <a:p>
-            <a:r>
-              <a:rPr lang="es-MX" dirty="0"/>
-              <a:t>Integrante</a:t>
-            </a:r>
-          </a:p>
           <a:p>
             <a:endParaRPr lang="es-MX" dirty="0"/>
           </a:p>
@@ -3955,7 +3949,7 @@
                 <a:latin typeface="Arial" panose="020B0604020202020204" pitchFamily="34" charset="0"/>
                 <a:cs typeface="Arial" panose="020B0604020202020204" pitchFamily="34" charset="0"/>
               </a:rPr>
-              <a:t>El objetivo de un Diccionario de Datos es marcar reglas de sintaxis, nomenclaturas, y documentar a lo largo del desarrollo o proyecto. Ayudan a  tener un mejor control de la información que entra/sale de la API REST, bajo reglas que a la institución le interesa mantener.</a:t>
+              <a:t>El objetivo de un Diccionario de datos es marcar reglas de sintaxis, nomenclaturas, y documentar a lo largo del desarrollo o proyecto. Ayudan a  tener un mejor control de la información que entra/sale de la API REST, bajo reglas que a la institución le interesa mantener.</a:t>
             </a:r>
             <a:endParaRPr lang="es-MX" sz="2400" dirty="0">
               <a:latin typeface="Arial" panose="020B0604020202020204" pitchFamily="34" charset="0"/>
@@ -6126,7 +6120,7 @@
                 <a:latin typeface="Arial" panose="020B0604020202020204" pitchFamily="34" charset="0"/>
                 <a:cs typeface="Arial" panose="020B0604020202020204" pitchFamily="34" charset="0"/>
               </a:rPr>
-              <a:t>HERRAMIENTAS DE SOFTWARE Y TECNOLOGIAS</a:t>
+              <a:t>HERRAMIENTAS DE SOFTWARE Y TECNOLOGÍAS</a:t>
             </a:r>
             <a:br>
               <a:rPr lang="es-MX" sz="3200" dirty="0">

</xml_diff>